<commit_message>
update and delete ADO.net code added with
String interpolation technique ($)
</commit_message>
<xml_diff>
--- a/Notes PPT/10 Database Connected.pptx
+++ b/Notes PPT/10 Database Connected.pptx
@@ -295,7 +295,7 @@
               <a:pPr>
                 <a:defRPr/>
               </a:pPr>
-              <a:t>3/15/2024</a:t>
+              <a:t>7/10/2024</a:t>
             </a:fld>
             <a:endParaRPr lang="en-IN"/>
           </a:p>
@@ -7313,7 +7313,7 @@
               <a:pPr>
                 <a:defRPr/>
               </a:pPr>
-              <a:t>3/15/2024</a:t>
+              <a:t>7/10/2024</a:t>
             </a:fld>
             <a:endParaRPr lang="en-US"/>
           </a:p>
@@ -7513,7 +7513,7 @@
               <a:pPr>
                 <a:defRPr/>
               </a:pPr>
-              <a:t>3/15/2024</a:t>
+              <a:t>7/10/2024</a:t>
             </a:fld>
             <a:endParaRPr lang="en-US" dirty="0"/>
           </a:p>
@@ -7718,7 +7718,7 @@
               <a:pPr>
                 <a:defRPr/>
               </a:pPr>
-              <a:t>3/15/2024</a:t>
+              <a:t>7/10/2024</a:t>
             </a:fld>
             <a:endParaRPr lang="en-US"/>
           </a:p>
@@ -7913,7 +7913,7 @@
               <a:pPr>
                 <a:defRPr/>
               </a:pPr>
-              <a:t>3/15/2024</a:t>
+              <a:t>7/10/2024</a:t>
             </a:fld>
             <a:endParaRPr lang="en-US"/>
           </a:p>
@@ -8229,7 +8229,7 @@
               <a:pPr>
                 <a:defRPr/>
               </a:pPr>
-              <a:t>3/15/2024</a:t>
+              <a:t>7/10/2024</a:t>
             </a:fld>
             <a:endParaRPr lang="en-US"/>
           </a:p>
@@ -8522,7 +8522,7 @@
               <a:pPr>
                 <a:defRPr/>
               </a:pPr>
-              <a:t>3/15/2024</a:t>
+              <a:t>7/10/2024</a:t>
             </a:fld>
             <a:endParaRPr lang="en-US" dirty="0"/>
           </a:p>
@@ -8997,7 +8997,7 @@
               <a:pPr>
                 <a:defRPr/>
               </a:pPr>
-              <a:t>3/15/2024</a:t>
+              <a:t>7/10/2024</a:t>
             </a:fld>
             <a:endParaRPr lang="en-US"/>
           </a:p>
@@ -9151,7 +9151,7 @@
               <a:pPr>
                 <a:defRPr/>
               </a:pPr>
-              <a:t>3/15/2024</a:t>
+              <a:t>7/10/2024</a:t>
             </a:fld>
             <a:endParaRPr lang="en-US" dirty="0"/>
           </a:p>
@@ -9273,7 +9273,7 @@
               <a:pPr>
                 <a:defRPr/>
               </a:pPr>
-              <a:t>3/15/2024</a:t>
+              <a:t>7/10/2024</a:t>
             </a:fld>
             <a:endParaRPr lang="en-US"/>
           </a:p>
@@ -9610,7 +9610,7 @@
               <a:pPr>
                 <a:defRPr/>
               </a:pPr>
-              <a:t>3/15/2024</a:t>
+              <a:t>7/10/2024</a:t>
             </a:fld>
             <a:endParaRPr lang="en-US"/>
           </a:p>
@@ -9856,7 +9856,7 @@
               <a:pPr>
                 <a:defRPr/>
               </a:pPr>
-              <a:t>3/15/2024</a:t>
+              <a:t>7/10/2024</a:t>
             </a:fld>
             <a:endParaRPr lang="en-US"/>
           </a:p>
@@ -10160,7 +10160,7 @@
               <a:pPr>
                 <a:defRPr/>
               </a:pPr>
-              <a:t>3/15/2024</a:t>
+              <a:t>7/10/2024</a:t>
             </a:fld>
             <a:endParaRPr lang="en-US" dirty="0"/>
           </a:p>

</xml_diff>